<commit_message>
updated as per new template provided by BoB
</commit_message>
<xml_diff>
--- a/bob_automatedcheck_3GuysFromEdinburgh.pptx
+++ b/bob_automatedcheck_3GuysFromEdinburgh.pptx
@@ -35156,9 +35156,49 @@
             </a:pPr>
             <a:r>
               <a:rPr lang="en-GB" sz="1500"/>
-              <a:t>Team member names</a:t>
+              <a:t>Jeevanatham M</a:t>
             </a:r>
-            <a:endParaRPr sz="1500"/>
+            <a:endParaRPr lang="en-GB" sz="1500"/>
+          </a:p>
+          <a:p>
+            <a:pPr marL="0" lvl="0" indent="0" algn="l" rtl="0">
+              <a:lnSpc>
+                <a:spcPct val="150000"/>
+              </a:lnSpc>
+              <a:spcBef>
+                <a:spcPts val="0"/>
+              </a:spcBef>
+              <a:spcAft>
+                <a:spcPts val="1600"/>
+              </a:spcAft>
+              <a:buSzPts val="1800"/>
+              <a:buNone/>
+            </a:pPr>
+            <a:r>
+              <a:rPr lang="en-GB" sz="1500"/>
+              <a:t>Pallavi R</a:t>
+            </a:r>
+            <a:endParaRPr lang="en-GB" sz="1500"/>
+          </a:p>
+          <a:p>
+            <a:pPr marL="0" lvl="0" indent="0" algn="l" rtl="0">
+              <a:lnSpc>
+                <a:spcPct val="150000"/>
+              </a:lnSpc>
+              <a:spcBef>
+                <a:spcPts val="0"/>
+              </a:spcBef>
+              <a:spcAft>
+                <a:spcPts val="1600"/>
+              </a:spcAft>
+              <a:buSzPts val="1800"/>
+              <a:buNone/>
+            </a:pPr>
+            <a:r>
+              <a:rPr lang="en-GB" sz="1500"/>
+              <a:t>Sivakumar Sankararaman</a:t>
+            </a:r>
+            <a:endParaRPr lang="en-GB" sz="1500"/>
           </a:p>
         </p:txBody>
       </p:sp>
@@ -35830,7 +35870,94 @@
                 <a:cs typeface="Lato" panose="020F0502020204030203"/>
                 <a:sym typeface="Lato" panose="020F0502020204030203"/>
               </a:rPr>
-              <a:t>This solution will helpAutomated check processing</a:t>
+              <a:t>This solution will help</a:t>
+            </a:r>
+            <a:r>
+              <a:rPr lang="en-GB" altLang="en-US" sz="1400" b="0" i="0" u="none" strike="noStrike" cap="none">
+                <a:solidFill>
+                  <a:srgbClr val="222222"/>
+                </a:solidFill>
+                <a:highlight>
+                  <a:srgbClr val="FFFFFF"/>
+                </a:highlight>
+                <a:latin typeface="Lato" panose="020F0502020204030203"/>
+                <a:ea typeface="Lato" panose="020F0502020204030203"/>
+                <a:cs typeface="Lato" panose="020F0502020204030203"/>
+                <a:sym typeface="Lato" panose="020F0502020204030203"/>
+              </a:rPr>
+              <a:t> </a:t>
+            </a:r>
+            <a:r>
+              <a:rPr lang="en-US" altLang="en-GB" sz="1400" b="0" i="0" u="none" strike="noStrike" cap="none">
+                <a:solidFill>
+                  <a:srgbClr val="222222"/>
+                </a:solidFill>
+                <a:highlight>
+                  <a:srgbClr val="FFFFFF"/>
+                </a:highlight>
+                <a:latin typeface="Lato" panose="020F0502020204030203"/>
+                <a:ea typeface="Lato" panose="020F0502020204030203"/>
+                <a:cs typeface="Lato" panose="020F0502020204030203"/>
+                <a:sym typeface="Lato" panose="020F0502020204030203"/>
+              </a:rPr>
+              <a:t>Automated </a:t>
+            </a:r>
+            <a:r>
+              <a:rPr lang="en-US">
+                <a:highlight>
+                  <a:srgbClr val="FFFFFF"/>
+                </a:highlight>
+                <a:latin typeface="Lato" panose="020F0502020204030203"/>
+                <a:ea typeface="Lato" panose="020F0502020204030203"/>
+                <a:cs typeface="Lato" panose="020F0502020204030203"/>
+                <a:sym typeface="Lato" panose="020F0502020204030203"/>
+              </a:rPr>
+              <a:t>Cheque</a:t>
+            </a:r>
+            <a:r>
+              <a:rPr lang="en-US" altLang="en-GB" sz="1400" b="0" i="0" u="none" strike="noStrike" cap="none">
+                <a:solidFill>
+                  <a:srgbClr val="222222"/>
+                </a:solidFill>
+                <a:highlight>
+                  <a:srgbClr val="FFFFFF"/>
+                </a:highlight>
+                <a:latin typeface="Lato" panose="020F0502020204030203"/>
+                <a:ea typeface="Lato" panose="020F0502020204030203"/>
+                <a:cs typeface="Lato" panose="020F0502020204030203"/>
+                <a:sym typeface="Lato" panose="020F0502020204030203"/>
+              </a:rPr>
+              <a:t> </a:t>
+            </a:r>
+            <a:r>
+              <a:rPr lang="en-GB" altLang="en-US" sz="1400" b="0" i="0" u="none" strike="noStrike" cap="none">
+                <a:solidFill>
+                  <a:srgbClr val="222222"/>
+                </a:solidFill>
+                <a:highlight>
+                  <a:srgbClr val="FFFFFF"/>
+                </a:highlight>
+                <a:latin typeface="Lato" panose="020F0502020204030203"/>
+                <a:ea typeface="Lato" panose="020F0502020204030203"/>
+                <a:cs typeface="Lato" panose="020F0502020204030203"/>
+                <a:sym typeface="Lato" panose="020F0502020204030203"/>
+              </a:rPr>
+              <a:t>P</a:t>
+            </a:r>
+            <a:r>
+              <a:rPr lang="en-US" altLang="en-GB" sz="1400" b="0" i="0" u="none" strike="noStrike" cap="none">
+                <a:solidFill>
+                  <a:srgbClr val="222222"/>
+                </a:solidFill>
+                <a:highlight>
+                  <a:srgbClr val="FFFFFF"/>
+                </a:highlight>
+                <a:latin typeface="Lato" panose="020F0502020204030203"/>
+                <a:ea typeface="Lato" panose="020F0502020204030203"/>
+                <a:cs typeface="Lato" panose="020F0502020204030203"/>
+                <a:sym typeface="Lato" panose="020F0502020204030203"/>
+              </a:rPr>
+              <a:t>rocessing</a:t>
             </a:r>
             <a:endParaRPr lang="en-US" altLang="en-GB" sz="1400" b="0" i="0" u="none" strike="noStrike" cap="none">
               <a:solidFill>
@@ -35876,7 +36003,49 @@
                 <a:cs typeface="Lato" panose="020F0502020204030203"/>
                 <a:sym typeface="Lato" panose="020F0502020204030203"/>
               </a:rPr>
-              <a:t>Consumer can scan and deposit check they had  received from mobile app as self service</a:t>
+              <a:t>Consumer can scan and deposit </a:t>
+            </a:r>
+            <a:r>
+              <a:rPr lang="en-GB" altLang="en-US" sz="1400" b="0" i="0" u="none" strike="noStrike" cap="none">
+                <a:solidFill>
+                  <a:srgbClr val="222222"/>
+                </a:solidFill>
+                <a:highlight>
+                  <a:srgbClr val="FFFFFF"/>
+                </a:highlight>
+                <a:latin typeface="Lato" panose="020F0502020204030203"/>
+                <a:ea typeface="Lato" panose="020F0502020204030203"/>
+                <a:cs typeface="Lato" panose="020F0502020204030203"/>
+                <a:sym typeface="Lato" panose="020F0502020204030203"/>
+              </a:rPr>
+              <a:t>c</a:t>
+            </a:r>
+            <a:r>
+              <a:rPr lang="en-US">
+                <a:highlight>
+                  <a:srgbClr val="FFFFFF"/>
+                </a:highlight>
+                <a:latin typeface="Lato" panose="020F0502020204030203"/>
+                <a:ea typeface="Lato" panose="020F0502020204030203"/>
+                <a:cs typeface="Lato" panose="020F0502020204030203"/>
+                <a:sym typeface="Lato" panose="020F0502020204030203"/>
+              </a:rPr>
+              <a:t>heque</a:t>
+            </a:r>
+            <a:r>
+              <a:rPr lang="en-US" altLang="en-GB" sz="1400" b="0" i="0" u="none" strike="noStrike" cap="none">
+                <a:solidFill>
+                  <a:srgbClr val="222222"/>
+                </a:solidFill>
+                <a:highlight>
+                  <a:srgbClr val="FFFFFF"/>
+                </a:highlight>
+                <a:latin typeface="Lato" panose="020F0502020204030203"/>
+                <a:ea typeface="Lato" panose="020F0502020204030203"/>
+                <a:cs typeface="Lato" panose="020F0502020204030203"/>
+                <a:sym typeface="Lato" panose="020F0502020204030203"/>
+              </a:rPr>
+              <a:t> they had  received from mobile app as self service</a:t>
             </a:r>
             <a:endParaRPr lang="en-US" altLang="en-GB" sz="1400" b="0" i="0" u="none" strike="noStrike" cap="none">
               <a:solidFill>
@@ -35922,7 +36091,34 @@
                 <a:cs typeface="Lato" panose="020F0502020204030203"/>
                 <a:sym typeface="Lato" panose="020F0502020204030203"/>
               </a:rPr>
-              <a:t>No need to walk into ATM or Branch for depositing check</a:t>
+              <a:t>No need to walk into ATM or Branch for depositing </a:t>
+            </a:r>
+            <a:r>
+              <a:rPr lang="en-GB" altLang="en-US" sz="1400" b="0" i="0" u="none" strike="noStrike" cap="none">
+                <a:solidFill>
+                  <a:srgbClr val="222222"/>
+                </a:solidFill>
+                <a:highlight>
+                  <a:srgbClr val="FFFFFF"/>
+                </a:highlight>
+                <a:latin typeface="Lato" panose="020F0502020204030203"/>
+                <a:ea typeface="Lato" panose="020F0502020204030203"/>
+                <a:cs typeface="Lato" panose="020F0502020204030203"/>
+                <a:sym typeface="Lato" panose="020F0502020204030203"/>
+              </a:rPr>
+              <a:t>c</a:t>
+            </a:r>
+            <a:r>
+              <a:rPr lang="en-US">
+                <a:highlight>
+                  <a:srgbClr val="FFFFFF"/>
+                </a:highlight>
+                <a:latin typeface="Lato" panose="020F0502020204030203"/>
+                <a:ea typeface="Lato" panose="020F0502020204030203"/>
+                <a:cs typeface="Lato" panose="020F0502020204030203"/>
+                <a:sym typeface="Lato" panose="020F0502020204030203"/>
+              </a:rPr>
+              <a:t>heque</a:t>
             </a:r>
             <a:endParaRPr lang="en-US" altLang="en-GB" sz="1400" b="0" i="0" u="none" strike="noStrike" cap="none">
               <a:solidFill>
@@ -36002,7 +36198,7 @@
               <a:buNone/>
             </a:pPr>
             <a:r>
-              <a:rPr lang="en-US" altLang="en-GB" sz="1400" b="0" i="0" u="none" strike="noStrike" cap="none">
+              <a:rPr lang="en-US" altLang="en-GB" sz="1400" b="1" i="0" u="none" strike="noStrike" cap="none">
                 <a:solidFill>
                   <a:srgbClr val="222222"/>
                 </a:solidFill>
@@ -36016,7 +36212,7 @@
               </a:rPr>
               <a:t>Loan / Insurance processing</a:t>
             </a:r>
-            <a:endParaRPr lang="en-US" altLang="en-GB" sz="1400" b="0" i="0" u="none" strike="noStrike" cap="none">
+            <a:endParaRPr lang="en-US" altLang="en-GB" sz="1400" b="1" i="0" u="none" strike="noStrike" cap="none">
               <a:solidFill>
                 <a:srgbClr val="222222"/>
               </a:solidFill>
@@ -36696,7 +36892,15 @@
                       </a:pPr>
                       <a:r>
                         <a:rPr lang="en-US"/>
-                        <a:t>Azure Form Recong</a:t>
+                        <a:t>Azure Form </a:t>
+                      </a:r>
+                      <a:r>
+                        <a:rPr lang="en-GB" altLang="en-US"/>
+                        <a:t>R</a:t>
+                      </a:r>
+                      <a:r>
+                        <a:rPr lang="en-US"/>
+                        <a:t>ecognizer</a:t>
                       </a:r>
                       <a:endParaRPr lang="en-US"/>
                     </a:p>
@@ -37113,7 +37317,7 @@
             </a:pPr>
             <a:r>
               <a:rPr lang="en-GB" altLang="en-US" sz="3600"/>
-              <a:t>Customer submits check </a:t>
+              <a:t>Customer submits cheque </a:t>
             </a:r>
             <a:endParaRPr lang="en-GB" altLang="en-US" sz="3600"/>
           </a:p>
@@ -37124,7 +37328,7 @@
             </a:pPr>
             <a:r>
               <a:rPr lang="en-GB" altLang="en-US" sz="3600"/>
-              <a:t>For offline check, scanner scans check and uploads check image to Azure blob</a:t>
+              <a:t>For offline check, scanner scans cheque and uploads check image to Azure blob</a:t>
             </a:r>
             <a:endParaRPr lang="en-GB" altLang="en-US" sz="3600"/>
           </a:p>
@@ -37201,7 +37405,7 @@
             </a:pPr>
             <a:r>
               <a:rPr lang="en-GB" altLang="en-US" sz="3600"/>
-              <a:t>AI based which will be bogus check </a:t>
+              <a:t>AI based which will be bogus cheque </a:t>
             </a:r>
             <a:endParaRPr lang="en-GB" altLang="en-US" sz="3600"/>
           </a:p>
@@ -37212,7 +37416,7 @@
             </a:pPr>
             <a:r>
               <a:rPr lang="en-GB" altLang="en-US" sz="3600"/>
-              <a:t>Once signature verification and fraud detection checks are passed , processed data will be stored in Staging Datastore for further processing along with verification results</a:t>
+              <a:t>Once signature verification and fraud detection cheques are passed , processed data will be stored in Staging Datastore for further processing along with verification results</a:t>
             </a:r>
             <a:endParaRPr lang="en-GB" altLang="en-US" sz="3600"/>
           </a:p>
@@ -37346,7 +37550,7 @@
       </p:sp>
       <p:pic>
         <p:nvPicPr>
-          <p:cNvPr id="3" name="Picture 2" descr="Automated-Check"/>
+          <p:cNvPr id="2" name="Picture 1" descr="Automated-Check"/>
           <p:cNvPicPr>
             <a:picLocks noChangeAspect="1"/>
           </p:cNvPicPr>
@@ -37360,8 +37564,8 @@
         </p:blipFill>
         <p:spPr>
           <a:xfrm>
-            <a:off x="1403350" y="627380"/>
-            <a:ext cx="5517515" cy="4129405"/>
+            <a:off x="1331595" y="627380"/>
+            <a:ext cx="6137910" cy="4258945"/>
           </a:xfrm>
           <a:prstGeom prst="rect">
             <a:avLst/>

</xml_diff>

<commit_message>
updated with competetive product
</commit_message>
<xml_diff>
--- a/bob_automatedcheck_3GuysFromEdinburgh.pptx
+++ b/bob_automatedcheck_3GuysFromEdinburgh.pptx
@@ -34840,7 +34840,67 @@
                 <a:cs typeface="Trebuchet MS" panose="020B0603020202020204"/>
                 <a:sym typeface="Trebuchet MS" panose="020B0603020202020204"/>
               </a:rPr>
-              <a:t>:</a:t>
+              <a:t>: </a:t>
+            </a:r>
+            <a:r>
+              <a:rPr lang="en-US" altLang="en-GB" sz="1000" dirty="0">
+                <a:solidFill>
+                  <a:schemeClr val="lt1"/>
+                </a:solidFill>
+                <a:latin typeface="Trebuchet MS" panose="020B0603020202020204"/>
+                <a:ea typeface="Trebuchet MS" panose="020B0603020202020204"/>
+                <a:cs typeface="Trebuchet MS" panose="020B0603020202020204"/>
+                <a:sym typeface="Trebuchet MS" panose="020B0603020202020204"/>
+              </a:rPr>
+              <a:t>Post graduate in </a:t>
+            </a:r>
+            <a:r>
+              <a:rPr lang="en-US" altLang="en-GB" sz="1000" dirty="0" err="1">
+                <a:solidFill>
+                  <a:schemeClr val="lt1"/>
+                </a:solidFill>
+                <a:latin typeface="Trebuchet MS" panose="020B0603020202020204"/>
+                <a:ea typeface="Trebuchet MS" panose="020B0603020202020204"/>
+                <a:cs typeface="Trebuchet MS" panose="020B0603020202020204"/>
+                <a:sym typeface="Trebuchet MS" panose="020B0603020202020204"/>
+              </a:rPr>
+              <a:t>Bannari</a:t>
+            </a:r>
+            <a:r>
+              <a:rPr lang="en-US" altLang="en-GB" sz="1000" dirty="0">
+                <a:solidFill>
+                  <a:schemeClr val="lt1"/>
+                </a:solidFill>
+                <a:latin typeface="Trebuchet MS" panose="020B0603020202020204"/>
+                <a:ea typeface="Trebuchet MS" panose="020B0603020202020204"/>
+                <a:cs typeface="Trebuchet MS" panose="020B0603020202020204"/>
+                <a:sym typeface="Trebuchet MS" panose="020B0603020202020204"/>
+              </a:rPr>
+              <a:t> Amman institute of technology, </a:t>
+            </a:r>
+            <a:r>
+              <a:rPr lang="en-US" altLang="en-GB" sz="1000" dirty="0" err="1">
+                <a:solidFill>
+                  <a:schemeClr val="lt1"/>
+                </a:solidFill>
+                <a:latin typeface="Trebuchet MS" panose="020B0603020202020204"/>
+                <a:ea typeface="Trebuchet MS" panose="020B0603020202020204"/>
+                <a:cs typeface="Trebuchet MS" panose="020B0603020202020204"/>
+                <a:sym typeface="Trebuchet MS" panose="020B0603020202020204"/>
+              </a:rPr>
+              <a:t>Sathyamangalam</a:t>
+            </a:r>
+            <a:r>
+              <a:rPr lang="en-US" altLang="en-GB" sz="1000" dirty="0">
+                <a:solidFill>
+                  <a:schemeClr val="lt1"/>
+                </a:solidFill>
+                <a:latin typeface="Trebuchet MS" panose="020B0603020202020204"/>
+                <a:ea typeface="Trebuchet MS" panose="020B0603020202020204"/>
+                <a:cs typeface="Trebuchet MS" panose="020B0603020202020204"/>
+                <a:sym typeface="Trebuchet MS" panose="020B0603020202020204"/>
+              </a:rPr>
+              <a:t>, B-Tech – Computer Science and Business System.</a:t>
             </a:r>
             <a:endParaRPr lang="en-US" altLang="en-GB" sz="1000" i="0" u="none" strike="noStrike" cap="none">
               <a:solidFill>
@@ -36365,8 +36425,8 @@
         </p:nvSpPr>
         <p:spPr>
           <a:xfrm>
-            <a:off x="342195" y="805860"/>
-            <a:ext cx="8238600" cy="3414300"/>
+            <a:off x="362585" y="805815"/>
+            <a:ext cx="3569970" cy="3695700"/>
           </a:xfrm>
           <a:prstGeom prst="rect">
             <a:avLst/>
@@ -36400,7 +36460,7 @@
               <a:buNone/>
             </a:pPr>
             <a:r>
-              <a:rPr lang="en-GB" sz="1400" b="0" i="0" u="none" strike="noStrike" cap="none">
+              <a:rPr lang="en-US" altLang="en-GB" sz="1400" b="0" i="0" u="none" strike="noStrike" cap="none">
                 <a:solidFill>
                   <a:srgbClr val="222222"/>
                 </a:solidFill>
@@ -36411,10 +36471,11 @@
                 <a:ea typeface="Lato" panose="020F0502020204030203"/>
                 <a:cs typeface="Lato" panose="020F0502020204030203"/>
                 <a:sym typeface="Lato" panose="020F0502020204030203"/>
+                <a:hlinkClick r:id="rId1" tooltip="" action="ppaction://hlinkfile"/>
               </a:rPr>
-              <a:t>What are the alternatives/competitive products for the problem you are solving?</a:t>
+              <a:t>Chequereader </a:t>
             </a:r>
-            <a:endParaRPr lang="en-GB" sz="1400" b="0" i="0" u="none" strike="noStrike" cap="none">
+            <a:endParaRPr lang="en-US" altLang="en-GB" sz="1400" b="0" i="0" u="none" strike="noStrike" cap="none">
               <a:solidFill>
                 <a:srgbClr val="222222"/>
               </a:solidFill>
@@ -36425,6 +36486,330 @@
               <a:ea typeface="Lato" panose="020F0502020204030203"/>
               <a:cs typeface="Lato" panose="020F0502020204030203"/>
               <a:sym typeface="Lato" panose="020F0502020204030203"/>
+              <a:hlinkClick r:id="rId1" tooltip="" action="ppaction://hlinkfile"/>
+            </a:endParaRPr>
+          </a:p>
+          <a:p>
+            <a:pPr marL="285750" marR="0" lvl="0" indent="-285750" algn="l" rtl="0">
+              <a:lnSpc>
+                <a:spcPct val="115000"/>
+              </a:lnSpc>
+              <a:spcBef>
+                <a:spcPts val="1000"/>
+              </a:spcBef>
+              <a:spcAft>
+                <a:spcPts val="1000"/>
+              </a:spcAft>
+              <a:buClr>
+                <a:srgbClr val="000000"/>
+              </a:buClr>
+              <a:buSzPts val="1400"/>
+              <a:buFont typeface="Arial" panose="020B0604020202020204" pitchFamily="34" charset="0"/>
+              <a:buChar char="•"/>
+            </a:pPr>
+            <a:r>
+              <a:rPr lang="en-US" altLang="en-GB" sz="1000" b="0" i="0" u="none" strike="noStrike" cap="none">
+                <a:solidFill>
+                  <a:srgbClr val="222222"/>
+                </a:solidFill>
+                <a:highlight>
+                  <a:srgbClr val="FFFFFF"/>
+                </a:highlight>
+                <a:latin typeface="Lato" panose="020F0502020204030203"/>
+                <a:ea typeface="Lato" panose="020F0502020204030203"/>
+                <a:cs typeface="Lato" panose="020F0502020204030203"/>
+                <a:sym typeface="Lato" panose="020F0502020204030203"/>
+              </a:rPr>
+              <a:t>Amount ( bothprinted and Handwritten Both)</a:t>
+            </a:r>
+            <a:endParaRPr lang="en-US" altLang="en-GB" sz="1000" b="0" i="0" u="none" strike="noStrike" cap="none">
+              <a:solidFill>
+                <a:srgbClr val="222222"/>
+              </a:solidFill>
+              <a:highlight>
+                <a:srgbClr val="FFFFFF"/>
+              </a:highlight>
+              <a:latin typeface="Lato" panose="020F0502020204030203"/>
+              <a:ea typeface="Lato" panose="020F0502020204030203"/>
+              <a:cs typeface="Lato" panose="020F0502020204030203"/>
+              <a:sym typeface="Lato" panose="020F0502020204030203"/>
+            </a:endParaRPr>
+          </a:p>
+          <a:p>
+            <a:pPr marL="285750" marR="0" lvl="0" indent="-285750" algn="l" rtl="0">
+              <a:lnSpc>
+                <a:spcPct val="115000"/>
+              </a:lnSpc>
+              <a:spcBef>
+                <a:spcPts val="1000"/>
+              </a:spcBef>
+              <a:spcAft>
+                <a:spcPts val="1000"/>
+              </a:spcAft>
+              <a:buClr>
+                <a:srgbClr val="000000"/>
+              </a:buClr>
+              <a:buSzPts val="1400"/>
+              <a:buFont typeface="Arial" panose="020B0604020202020204" pitchFamily="34" charset="0"/>
+              <a:buChar char="•"/>
+            </a:pPr>
+            <a:r>
+              <a:rPr lang="en-US" altLang="en-GB" sz="1000" b="0" i="0" u="none" strike="noStrike" cap="none">
+                <a:solidFill>
+                  <a:srgbClr val="222222"/>
+                </a:solidFill>
+                <a:highlight>
+                  <a:srgbClr val="FFFFFF"/>
+                </a:highlight>
+                <a:latin typeface="Lato" panose="020F0502020204030203"/>
+                <a:ea typeface="Lato" panose="020F0502020204030203"/>
+                <a:cs typeface="Lato" panose="020F0502020204030203"/>
+                <a:sym typeface="Lato" panose="020F0502020204030203"/>
+              </a:rPr>
+              <a:t>Date (Printed and Handwritten Both)</a:t>
+            </a:r>
+            <a:endParaRPr lang="en-US" altLang="en-GB" sz="1000" b="0" i="0" u="none" strike="noStrike" cap="none">
+              <a:solidFill>
+                <a:srgbClr val="222222"/>
+              </a:solidFill>
+              <a:highlight>
+                <a:srgbClr val="FFFFFF"/>
+              </a:highlight>
+              <a:latin typeface="Lato" panose="020F0502020204030203"/>
+              <a:ea typeface="Lato" panose="020F0502020204030203"/>
+              <a:cs typeface="Lato" panose="020F0502020204030203"/>
+              <a:sym typeface="Lato" panose="020F0502020204030203"/>
+            </a:endParaRPr>
+          </a:p>
+          <a:p>
+            <a:pPr marL="285750" marR="0" lvl="0" indent="-285750" algn="l" rtl="0">
+              <a:lnSpc>
+                <a:spcPct val="115000"/>
+              </a:lnSpc>
+              <a:spcBef>
+                <a:spcPts val="1000"/>
+              </a:spcBef>
+              <a:spcAft>
+                <a:spcPts val="1000"/>
+              </a:spcAft>
+              <a:buClr>
+                <a:srgbClr val="000000"/>
+              </a:buClr>
+              <a:buSzPts val="1400"/>
+              <a:buFont typeface="Arial" panose="020B0604020202020204" pitchFamily="34" charset="0"/>
+              <a:buChar char="•"/>
+            </a:pPr>
+            <a:r>
+              <a:rPr lang="en-US" altLang="en-GB" sz="1000" b="0" i="0" u="none" strike="noStrike" cap="none">
+                <a:solidFill>
+                  <a:srgbClr val="222222"/>
+                </a:solidFill>
+                <a:highlight>
+                  <a:srgbClr val="FFFFFF"/>
+                </a:highlight>
+                <a:latin typeface="Lato" panose="020F0502020204030203"/>
+                <a:ea typeface="Lato" panose="020F0502020204030203"/>
+                <a:cs typeface="Lato" panose="020F0502020204030203"/>
+                <a:sym typeface="Lato" panose="020F0502020204030203"/>
+              </a:rPr>
+              <a:t>Account Number</a:t>
+            </a:r>
+            <a:endParaRPr lang="en-US" altLang="en-GB" sz="1000" b="0" i="0" u="none" strike="noStrike" cap="none">
+              <a:solidFill>
+                <a:srgbClr val="222222"/>
+              </a:solidFill>
+              <a:highlight>
+                <a:srgbClr val="FFFFFF"/>
+              </a:highlight>
+              <a:latin typeface="Lato" panose="020F0502020204030203"/>
+              <a:ea typeface="Lato" panose="020F0502020204030203"/>
+              <a:cs typeface="Lato" panose="020F0502020204030203"/>
+              <a:sym typeface="Lato" panose="020F0502020204030203"/>
+            </a:endParaRPr>
+          </a:p>
+          <a:p>
+            <a:pPr marL="285750" marR="0" lvl="0" indent="-285750" algn="l" rtl="0">
+              <a:lnSpc>
+                <a:spcPct val="115000"/>
+              </a:lnSpc>
+              <a:spcBef>
+                <a:spcPts val="1000"/>
+              </a:spcBef>
+              <a:spcAft>
+                <a:spcPts val="1000"/>
+              </a:spcAft>
+              <a:buClr>
+                <a:srgbClr val="000000"/>
+              </a:buClr>
+              <a:buSzPts val="1400"/>
+              <a:buFont typeface="Arial" panose="020B0604020202020204" pitchFamily="34" charset="0"/>
+              <a:buChar char="•"/>
+            </a:pPr>
+            <a:r>
+              <a:rPr lang="en-US" altLang="en-GB" sz="1000" b="0" i="0" u="none" strike="noStrike" cap="none">
+                <a:solidFill>
+                  <a:srgbClr val="222222"/>
+                </a:solidFill>
+                <a:highlight>
+                  <a:srgbClr val="FFFFFF"/>
+                </a:highlight>
+                <a:latin typeface="Lato" panose="020F0502020204030203"/>
+                <a:ea typeface="Lato" panose="020F0502020204030203"/>
+                <a:cs typeface="Lato" panose="020F0502020204030203"/>
+                <a:sym typeface="Lato" panose="020F0502020204030203"/>
+              </a:rPr>
+              <a:t>MICR Code</a:t>
+            </a:r>
+            <a:endParaRPr lang="en-US" altLang="en-GB" sz="1000" b="0" i="0" u="none" strike="noStrike" cap="none">
+              <a:solidFill>
+                <a:srgbClr val="222222"/>
+              </a:solidFill>
+              <a:highlight>
+                <a:srgbClr val="FFFFFF"/>
+              </a:highlight>
+              <a:latin typeface="Lato" panose="020F0502020204030203"/>
+              <a:ea typeface="Lato" panose="020F0502020204030203"/>
+              <a:cs typeface="Lato" panose="020F0502020204030203"/>
+              <a:sym typeface="Lato" panose="020F0502020204030203"/>
+            </a:endParaRPr>
+          </a:p>
+          <a:p>
+            <a:pPr marL="285750" marR="0" lvl="0" indent="-285750" algn="l" rtl="0">
+              <a:lnSpc>
+                <a:spcPct val="115000"/>
+              </a:lnSpc>
+              <a:spcBef>
+                <a:spcPts val="1000"/>
+              </a:spcBef>
+              <a:spcAft>
+                <a:spcPts val="1000"/>
+              </a:spcAft>
+              <a:buClr>
+                <a:srgbClr val="000000"/>
+              </a:buClr>
+              <a:buSzPts val="1400"/>
+              <a:buFont typeface="Arial" panose="020B0604020202020204" pitchFamily="34" charset="0"/>
+              <a:buChar char="•"/>
+            </a:pPr>
+            <a:r>
+              <a:rPr lang="en-US" altLang="en-GB" sz="1000" b="0" i="0" u="none" strike="noStrike" cap="none">
+                <a:solidFill>
+                  <a:srgbClr val="222222"/>
+                </a:solidFill>
+                <a:highlight>
+                  <a:srgbClr val="FFFFFF"/>
+                </a:highlight>
+                <a:latin typeface="Lato" panose="020F0502020204030203"/>
+                <a:ea typeface="Lato" panose="020F0502020204030203"/>
+                <a:cs typeface="Lato" panose="020F0502020204030203"/>
+                <a:sym typeface="Lato" panose="020F0502020204030203"/>
+              </a:rPr>
+              <a:t>Account Name</a:t>
+            </a:r>
+            <a:endParaRPr lang="en-US" altLang="en-GB" sz="1000" b="0" i="0" u="none" strike="noStrike" cap="none">
+              <a:solidFill>
+                <a:srgbClr val="222222"/>
+              </a:solidFill>
+              <a:highlight>
+                <a:srgbClr val="FFFFFF"/>
+              </a:highlight>
+              <a:latin typeface="Lato" panose="020F0502020204030203"/>
+              <a:ea typeface="Lato" panose="020F0502020204030203"/>
+              <a:cs typeface="Lato" panose="020F0502020204030203"/>
+              <a:sym typeface="Lato" panose="020F0502020204030203"/>
+            </a:endParaRPr>
+          </a:p>
+          <a:p>
+            <a:pPr marL="285750" marR="0" lvl="0" indent="-285750" algn="l" rtl="0">
+              <a:lnSpc>
+                <a:spcPct val="115000"/>
+              </a:lnSpc>
+              <a:spcBef>
+                <a:spcPts val="1000"/>
+              </a:spcBef>
+              <a:spcAft>
+                <a:spcPts val="1000"/>
+              </a:spcAft>
+              <a:buClr>
+                <a:srgbClr val="000000"/>
+              </a:buClr>
+              <a:buSzPts val="1400"/>
+              <a:buFont typeface="Arial" panose="020B0604020202020204" pitchFamily="34" charset="0"/>
+              <a:buChar char="•"/>
+            </a:pPr>
+            <a:r>
+              <a:rPr lang="en-US" altLang="en-GB" sz="1000" b="0" i="0" u="none" strike="noStrike" cap="none">
+                <a:solidFill>
+                  <a:srgbClr val="222222"/>
+                </a:solidFill>
+                <a:highlight>
+                  <a:srgbClr val="FFFFFF"/>
+                </a:highlight>
+                <a:latin typeface="Lato" panose="020F0502020204030203"/>
+                <a:ea typeface="Lato" panose="020F0502020204030203"/>
+                <a:cs typeface="Lato" panose="020F0502020204030203"/>
+                <a:sym typeface="Lato" panose="020F0502020204030203"/>
+              </a:rPr>
+              <a:t>Backside Account Number (Payee Account Number)</a:t>
+            </a:r>
+            <a:endParaRPr lang="en-US" altLang="en-GB" sz="1000" b="0" i="0" u="none" strike="noStrike" cap="none">
+              <a:solidFill>
+                <a:srgbClr val="222222"/>
+              </a:solidFill>
+              <a:highlight>
+                <a:srgbClr val="FFFFFF"/>
+              </a:highlight>
+              <a:latin typeface="Lato" panose="020F0502020204030203"/>
+              <a:ea typeface="Lato" panose="020F0502020204030203"/>
+              <a:cs typeface="Lato" panose="020F0502020204030203"/>
+              <a:sym typeface="Lato" panose="020F0502020204030203"/>
+            </a:endParaRPr>
+          </a:p>
+          <a:p>
+            <a:pPr marL="285750" marR="0" lvl="0" indent="-285750" algn="l" rtl="0">
+              <a:lnSpc>
+                <a:spcPct val="115000"/>
+              </a:lnSpc>
+              <a:spcBef>
+                <a:spcPts val="1000"/>
+              </a:spcBef>
+              <a:spcAft>
+                <a:spcPts val="1000"/>
+              </a:spcAft>
+              <a:buClr>
+                <a:srgbClr val="000000"/>
+              </a:buClr>
+              <a:buSzPts val="1400"/>
+              <a:buFont typeface="Arial" panose="020B0604020202020204" pitchFamily="34" charset="0"/>
+              <a:buChar char="•"/>
+            </a:pPr>
+            <a:r>
+              <a:rPr lang="en-US" altLang="en-GB" sz="1000" b="0" i="0" u="none" strike="noStrike" cap="none">
+                <a:solidFill>
+                  <a:srgbClr val="222222"/>
+                </a:solidFill>
+                <a:highlight>
+                  <a:srgbClr val="FFFFFF"/>
+                </a:highlight>
+                <a:latin typeface="Lato" panose="020F0502020204030203"/>
+                <a:ea typeface="Lato" panose="020F0502020204030203"/>
+                <a:cs typeface="Lato" panose="020F0502020204030203"/>
+                <a:sym typeface="Lato" panose="020F0502020204030203"/>
+              </a:rPr>
+              <a:t>Automatic UV Logo Verification (To Prevent Fraud)</a:t>
+            </a:r>
+            <a:endParaRPr lang="en-US" altLang="en-GB" sz="1400" b="0" i="0" u="none" strike="noStrike" cap="none">
+              <a:solidFill>
+                <a:srgbClr val="222222"/>
+              </a:solidFill>
+              <a:highlight>
+                <a:srgbClr val="FFFFFF"/>
+              </a:highlight>
+              <a:latin typeface="Lato" panose="020F0502020204030203"/>
+              <a:ea typeface="Lato" panose="020F0502020204030203"/>
+              <a:cs typeface="Lato" panose="020F0502020204030203"/>
+              <a:sym typeface="Lato" panose="020F0502020204030203"/>
+              <a:hlinkClick r:id="rId1" tooltip="" action="ppaction://hlinkfile"/>
             </a:endParaRPr>
           </a:p>
           <a:p>
@@ -36498,10 +36883,265 @@
               <a:buNone/>
             </a:pPr>
             <a:r>
-              <a:rPr lang="en-GB" sz="2000"/>
-              <a:t>Pre-Requisite</a:t>
+              <a:rPr lang="en-US" altLang="en-GB" sz="2000" b="0">
+                <a:solidFill>
+                  <a:srgbClr val="222222"/>
+                </a:solidFill>
+                <a:highlight>
+                  <a:srgbClr val="FFFFFF"/>
+                </a:highlight>
+                <a:sym typeface="Lato" panose="020F0502020204030203"/>
+              </a:rPr>
+              <a:t>A</a:t>
             </a:r>
-            <a:endParaRPr sz="2000"/>
+            <a:r>
+              <a:rPr lang="en-GB" sz="2000" b="0">
+                <a:solidFill>
+                  <a:srgbClr val="222222"/>
+                </a:solidFill>
+                <a:highlight>
+                  <a:srgbClr val="FFFFFF"/>
+                </a:highlight>
+                <a:sym typeface="Lato" panose="020F0502020204030203"/>
+              </a:rPr>
+              <a:t>lternatives/</a:t>
+            </a:r>
+            <a:r>
+              <a:rPr lang="en-US" altLang="en-GB" sz="2000" b="0">
+                <a:solidFill>
+                  <a:srgbClr val="222222"/>
+                </a:solidFill>
+                <a:highlight>
+                  <a:srgbClr val="FFFFFF"/>
+                </a:highlight>
+                <a:sym typeface="Lato" panose="020F0502020204030203"/>
+              </a:rPr>
+              <a:t>C</a:t>
+            </a:r>
+            <a:r>
+              <a:rPr lang="en-GB" sz="2000" b="0">
+                <a:solidFill>
+                  <a:srgbClr val="222222"/>
+                </a:solidFill>
+                <a:highlight>
+                  <a:srgbClr val="FFFFFF"/>
+                </a:highlight>
+                <a:sym typeface="Lato" panose="020F0502020204030203"/>
+              </a:rPr>
+              <a:t>ompetitive products</a:t>
+            </a:r>
+            <a:endParaRPr lang="en-US" altLang="en-GB" sz="2000"/>
+          </a:p>
+        </p:txBody>
+      </p:sp>
+      <p:sp>
+        <p:nvSpPr>
+          <p:cNvPr id="1" name="Google Shape;359;p4"/>
+          <p:cNvSpPr txBox="1"/>
+          <p:nvPr/>
+        </p:nvSpPr>
+        <p:spPr>
+          <a:xfrm>
+            <a:off x="4787900" y="915670"/>
+            <a:ext cx="3569970" cy="3695700"/>
+          </a:xfrm>
+          <a:prstGeom prst="rect">
+            <a:avLst/>
+          </a:prstGeom>
+          <a:noFill/>
+          <a:ln>
+            <a:noFill/>
+          </a:ln>
+        </p:spPr>
+        <p:txBody>
+          <a:bodyPr spcFirstLastPara="1" wrap="square" lIns="91425" tIns="91425" rIns="91425" bIns="91425" anchor="t" anchorCtr="0">
+            <a:noAutofit/>
+          </a:bodyPr>
+          <a:p>
+            <a:pPr marL="0" marR="0" lvl="0" indent="0" algn="l" rtl="0">
+              <a:lnSpc>
+                <a:spcPct val="115000"/>
+              </a:lnSpc>
+              <a:spcBef>
+                <a:spcPts val="1000"/>
+              </a:spcBef>
+              <a:spcAft>
+                <a:spcPts val="1000"/>
+              </a:spcAft>
+              <a:buClr>
+                <a:srgbClr val="000000"/>
+              </a:buClr>
+              <a:buSzPts val="1400"/>
+              <a:buFont typeface="Arial" panose="020B0604020202020204"/>
+              <a:buNone/>
+            </a:pPr>
+            <a:r>
+              <a:rPr lang="en-US" altLang="en-GB" sz="1400" b="0" i="0" u="none" strike="noStrike" cap="none">
+                <a:solidFill>
+                  <a:srgbClr val="222222"/>
+                </a:solidFill>
+                <a:highlight>
+                  <a:srgbClr val="FFFFFF"/>
+                </a:highlight>
+                <a:latin typeface="Lato" panose="020F0502020204030203"/>
+                <a:ea typeface="Lato" panose="020F0502020204030203"/>
+                <a:cs typeface="Lato" panose="020F0502020204030203"/>
+                <a:sym typeface="Lato" panose="020F0502020204030203"/>
+                <a:hlinkClick r:id="rId2" tooltip="" action="ppaction://hlinkfile"/>
+              </a:rPr>
+              <a:t>Fraudone</a:t>
+            </a:r>
+            <a:endParaRPr lang="en-US" altLang="en-GB" sz="1400" b="0" i="0" u="none" strike="noStrike" cap="none">
+              <a:solidFill>
+                <a:srgbClr val="222222"/>
+              </a:solidFill>
+              <a:highlight>
+                <a:srgbClr val="FFFFFF"/>
+              </a:highlight>
+              <a:latin typeface="Lato" panose="020F0502020204030203"/>
+              <a:ea typeface="Lato" panose="020F0502020204030203"/>
+              <a:cs typeface="Lato" panose="020F0502020204030203"/>
+              <a:sym typeface="Lato" panose="020F0502020204030203"/>
+              <a:hlinkClick r:id="rId1" action="ppaction://hlinkfile"/>
+            </a:endParaRPr>
+          </a:p>
+          <a:p>
+            <a:pPr marL="285750" marR="0" lvl="0" indent="-285750" algn="l" rtl="0">
+              <a:lnSpc>
+                <a:spcPct val="115000"/>
+              </a:lnSpc>
+              <a:spcBef>
+                <a:spcPts val="1000"/>
+              </a:spcBef>
+              <a:spcAft>
+                <a:spcPts val="1000"/>
+              </a:spcAft>
+              <a:buClr>
+                <a:srgbClr val="000000"/>
+              </a:buClr>
+              <a:buSzPts val="1400"/>
+              <a:buFont typeface="Arial" panose="020B0604020202020204" pitchFamily="34" charset="0"/>
+              <a:buChar char="•"/>
+            </a:pPr>
+            <a:r>
+              <a:rPr lang="en-US" altLang="en-GB" sz="1000" b="0" i="0" u="none" strike="noStrike" cap="none">
+                <a:solidFill>
+                  <a:srgbClr val="222222"/>
+                </a:solidFill>
+                <a:highlight>
+                  <a:srgbClr val="FFFFFF"/>
+                </a:highlight>
+                <a:latin typeface="Lato" panose="020F0502020204030203"/>
+                <a:ea typeface="Lato" panose="020F0502020204030203"/>
+                <a:cs typeface="Lato" panose="020F0502020204030203"/>
+                <a:sym typeface="Lato" panose="020F0502020204030203"/>
+              </a:rPr>
+              <a:t>Counterfeit Check Detection </a:t>
+            </a:r>
+            <a:endParaRPr lang="en-US" altLang="en-GB" sz="1000" b="0" i="0" u="none" strike="noStrike" cap="none">
+              <a:solidFill>
+                <a:srgbClr val="222222"/>
+              </a:solidFill>
+              <a:highlight>
+                <a:srgbClr val="FFFFFF"/>
+              </a:highlight>
+              <a:latin typeface="Lato" panose="020F0502020204030203"/>
+              <a:ea typeface="Lato" panose="020F0502020204030203"/>
+              <a:cs typeface="Lato" panose="020F0502020204030203"/>
+              <a:sym typeface="Lato" panose="020F0502020204030203"/>
+            </a:endParaRPr>
+          </a:p>
+          <a:p>
+            <a:pPr marL="285750" marR="0" lvl="0" indent="-285750" algn="l" rtl="0">
+              <a:lnSpc>
+                <a:spcPct val="115000"/>
+              </a:lnSpc>
+              <a:spcBef>
+                <a:spcPts val="1000"/>
+              </a:spcBef>
+              <a:spcAft>
+                <a:spcPts val="1000"/>
+              </a:spcAft>
+              <a:buClr>
+                <a:srgbClr val="000000"/>
+              </a:buClr>
+              <a:buSzPts val="1400"/>
+              <a:buFont typeface="Arial" panose="020B0604020202020204" pitchFamily="34" charset="0"/>
+              <a:buChar char="•"/>
+            </a:pPr>
+            <a:r>
+              <a:rPr lang="en-US" altLang="en-GB" sz="1000" b="0" i="0" u="none" strike="noStrike" cap="none">
+                <a:solidFill>
+                  <a:srgbClr val="222222"/>
+                </a:solidFill>
+                <a:highlight>
+                  <a:srgbClr val="FFFFFF"/>
+                </a:highlight>
+                <a:latin typeface="Lato" panose="020F0502020204030203"/>
+                <a:ea typeface="Lato" panose="020F0502020204030203"/>
+                <a:cs typeface="Lato" panose="020F0502020204030203"/>
+                <a:sym typeface="Lato" panose="020F0502020204030203"/>
+              </a:rPr>
+              <a:t>Signature Forgery  </a:t>
+            </a:r>
+            <a:endParaRPr lang="en-US" altLang="en-GB" sz="1000" b="0" i="0" u="none" strike="noStrike" cap="none">
+              <a:solidFill>
+                <a:srgbClr val="222222"/>
+              </a:solidFill>
+              <a:highlight>
+                <a:srgbClr val="FFFFFF"/>
+              </a:highlight>
+              <a:latin typeface="Lato" panose="020F0502020204030203"/>
+              <a:ea typeface="Lato" panose="020F0502020204030203"/>
+              <a:cs typeface="Lato" panose="020F0502020204030203"/>
+              <a:sym typeface="Lato" panose="020F0502020204030203"/>
+            </a:endParaRPr>
+          </a:p>
+          <a:p>
+            <a:pPr marL="285750" marR="0" lvl="0" indent="-285750" algn="l" rtl="0">
+              <a:lnSpc>
+                <a:spcPct val="115000"/>
+              </a:lnSpc>
+              <a:spcBef>
+                <a:spcPts val="1000"/>
+              </a:spcBef>
+              <a:spcAft>
+                <a:spcPts val="1000"/>
+              </a:spcAft>
+              <a:buClr>
+                <a:srgbClr val="000000"/>
+              </a:buClr>
+              <a:buSzPts val="1400"/>
+              <a:buFont typeface="Arial" panose="020B0604020202020204" pitchFamily="34" charset="0"/>
+              <a:buChar char="•"/>
+            </a:pPr>
+            <a:r>
+              <a:rPr lang="en-US" altLang="en-GB" sz="1000" b="0" i="0" u="none" strike="noStrike" cap="none">
+                <a:solidFill>
+                  <a:srgbClr val="222222"/>
+                </a:solidFill>
+                <a:highlight>
+                  <a:srgbClr val="FFFFFF"/>
+                </a:highlight>
+                <a:latin typeface="Lato" panose="020F0502020204030203"/>
+                <a:ea typeface="Lato" panose="020F0502020204030203"/>
+                <a:cs typeface="Lato" panose="020F0502020204030203"/>
+                <a:sym typeface="Lato" panose="020F0502020204030203"/>
+              </a:rPr>
+              <a:t>Check Alteration </a:t>
+            </a:r>
+            <a:endParaRPr lang="en-US" altLang="en-GB" sz="1000" b="0" i="0" u="none" strike="noStrike" cap="none">
+              <a:solidFill>
+                <a:srgbClr val="222222"/>
+              </a:solidFill>
+              <a:highlight>
+                <a:srgbClr val="FFFFFF"/>
+              </a:highlight>
+              <a:latin typeface="Lato" panose="020F0502020204030203"/>
+              <a:ea typeface="Lato" panose="020F0502020204030203"/>
+              <a:cs typeface="Lato" panose="020F0502020204030203"/>
+              <a:sym typeface="Lato" panose="020F0502020204030203"/>
+            </a:endParaRPr>
           </a:p>
         </p:txBody>
       </p:sp>

</xml_diff>

<commit_message>
updated with e product, problem statement and key differentor
</commit_message>
<xml_diff>
--- a/bob_automatedcheck_3GuysFromEdinburgh.pptx
+++ b/bob_automatedcheck_3GuysFromEdinburgh.pptx
@@ -35343,8 +35343,8 @@
         </p:nvSpPr>
         <p:spPr>
           <a:xfrm>
-            <a:off x="323145" y="771570"/>
-            <a:ext cx="8238600" cy="3414300"/>
+            <a:off x="323215" y="771525"/>
+            <a:ext cx="8238490" cy="3660140"/>
           </a:xfrm>
           <a:prstGeom prst="rect">
             <a:avLst/>
@@ -35378,21 +35378,15 @@
               <a:buNone/>
             </a:pPr>
             <a:r>
-              <a:rPr lang="en-US" sz="1400" b="0" i="0" u="none" strike="noStrike" cap="none">
-                <a:solidFill>
-                  <a:srgbClr val="000000"/>
-                </a:solidFill>
+              <a:rPr lang="en-US">
                 <a:latin typeface="Lato" panose="020F0502020204030203"/>
                 <a:ea typeface="Lato" panose="020F0502020204030203"/>
                 <a:cs typeface="Lato" panose="020F0502020204030203"/>
                 <a:sym typeface="Lato" panose="020F0502020204030203"/>
               </a:rPr>
-              <a:t>Automated Cheque Processing (ACP) allows for faster cheque clearing. Paper cheques used to be processed manually, a process that took up to days to clear. With ACP, deposited cheques are cleared in hours</a:t>
+              <a:t>Our understanding is we have to come up with a comprehensive Proof Of Concept to address  below issues :</a:t>
             </a:r>
-            <a:endParaRPr lang="en-US" sz="1400" b="0" i="0" u="none" strike="noStrike" cap="none">
-              <a:solidFill>
-                <a:srgbClr val="000000"/>
-              </a:solidFill>
+            <a:endParaRPr lang="en-US">
               <a:latin typeface="Lato" panose="020F0502020204030203"/>
               <a:ea typeface="Lato" panose="020F0502020204030203"/>
               <a:cs typeface="Lato" panose="020F0502020204030203"/>
@@ -35417,10 +35411,7 @@
               <a:buFont typeface="Arial" panose="020B0604020202020204"/>
               <a:buNone/>
             </a:pPr>
-            <a:endParaRPr lang="en-US" sz="1400" b="0" i="0" u="none" strike="noStrike" cap="none">
-              <a:solidFill>
-                <a:srgbClr val="000000"/>
-              </a:solidFill>
+            <a:endParaRPr lang="en-US">
               <a:latin typeface="Lato" panose="020F0502020204030203"/>
               <a:ea typeface="Lato" panose="020F0502020204030203"/>
               <a:cs typeface="Lato" panose="020F0502020204030203"/>
@@ -35445,22 +35436,7 @@
               <a:buFont typeface="Arial" panose="020B0604020202020204"/>
               <a:buNone/>
             </a:pPr>
-            <a:r>
-              <a:rPr lang="en-US" sz="1400" b="0" i="0" u="none" strike="noStrike" cap="none">
-                <a:solidFill>
-                  <a:srgbClr val="000000"/>
-                </a:solidFill>
-                <a:latin typeface="Lato" panose="020F0502020204030203"/>
-                <a:ea typeface="Lato" panose="020F0502020204030203"/>
-                <a:cs typeface="Lato" panose="020F0502020204030203"/>
-                <a:sym typeface="Lato" panose="020F0502020204030203"/>
-              </a:rPr>
-              <a:t>ACP benefits consumers by:</a:t>
-            </a:r>
-            <a:endParaRPr lang="en-US" sz="1400" b="0" i="0" u="none" strike="noStrike" cap="none">
-              <a:solidFill>
-                <a:srgbClr val="000000"/>
-              </a:solidFill>
+            <a:endParaRPr lang="en-US">
               <a:latin typeface="Lato" panose="020F0502020204030203"/>
               <a:ea typeface="Lato" panose="020F0502020204030203"/>
               <a:cs typeface="Lato" panose="020F0502020204030203"/>
@@ -35468,7 +35444,7 @@
             </a:endParaRPr>
           </a:p>
           <a:p>
-            <a:pPr marL="285750" marR="0" lvl="0" indent="-285750" algn="l" rtl="0">
+            <a:pPr marL="342900" marR="0" lvl="0" indent="-342900" algn="l" rtl="0">
               <a:lnSpc>
                 <a:spcPct val="100000"/>
               </a:lnSpc>
@@ -35482,25 +35458,19 @@
                 <a:srgbClr val="000000"/>
               </a:buClr>
               <a:buSzPts val="1400"/>
-              <a:buFont typeface="Arial" panose="020B0604020202020204" pitchFamily="34" charset="0"/>
-              <a:buChar char="•"/>
+              <a:buFont typeface="Arial" panose="020B0604020202020204"/>
+              <a:buAutoNum type="arabicPeriod"/>
             </a:pPr>
             <a:r>
-              <a:rPr lang="en-US" sz="1400" b="0" i="0" u="none" strike="noStrike" cap="none">
-                <a:solidFill>
-                  <a:srgbClr val="000000"/>
-                </a:solidFill>
+              <a:rPr lang="en-US">
                 <a:latin typeface="Lato" panose="020F0502020204030203"/>
                 <a:ea typeface="Lato" panose="020F0502020204030203"/>
                 <a:cs typeface="Lato" panose="020F0502020204030203"/>
                 <a:sym typeface="Lato" panose="020F0502020204030203"/>
               </a:rPr>
-              <a:t>Making funds available faster</a:t>
+              <a:t>Paper cheques used to be processed manually, a process that took up to days to clear.  </a:t>
             </a:r>
-            <a:endParaRPr lang="en-US" sz="1400" b="0" i="0" u="none" strike="noStrike" cap="none">
-              <a:solidFill>
-                <a:srgbClr val="000000"/>
-              </a:solidFill>
+            <a:endParaRPr lang="en-US">
               <a:latin typeface="Lato" panose="020F0502020204030203"/>
               <a:ea typeface="Lato" panose="020F0502020204030203"/>
               <a:cs typeface="Lato" panose="020F0502020204030203"/>
@@ -35508,7 +35478,7 @@
             </a:endParaRPr>
           </a:p>
           <a:p>
-            <a:pPr marL="285750" marR="0" lvl="0" indent="-285750" algn="l" rtl="0">
+            <a:pPr marL="342900" marR="0" lvl="0" indent="-342900" algn="l" rtl="0">
               <a:lnSpc>
                 <a:spcPct val="100000"/>
               </a:lnSpc>
@@ -35522,25 +35492,19 @@
                 <a:srgbClr val="000000"/>
               </a:buClr>
               <a:buSzPts val="1400"/>
-              <a:buFont typeface="Arial" panose="020B0604020202020204" pitchFamily="34" charset="0"/>
-              <a:buChar char="•"/>
+              <a:buFont typeface="Arial" panose="020B0604020202020204"/>
+              <a:buAutoNum type="arabicPeriod"/>
             </a:pPr>
             <a:r>
-              <a:rPr lang="en-US" sz="1400" b="0" i="0" u="none" strike="noStrike" cap="none">
-                <a:solidFill>
-                  <a:srgbClr val="000000"/>
-                </a:solidFill>
+              <a:rPr lang="en-US">
                 <a:latin typeface="Lato" panose="020F0502020204030203"/>
                 <a:ea typeface="Lato" panose="020F0502020204030203"/>
                 <a:cs typeface="Lato" panose="020F0502020204030203"/>
                 <a:sym typeface="Lato" panose="020F0502020204030203"/>
               </a:rPr>
-              <a:t>Allowing quicker access to the digital image of their processed cheques</a:t>
+              <a:t>Large volume of cheque processing involves manual and strenuous human effort.  </a:t>
             </a:r>
-            <a:endParaRPr lang="en-US" sz="1400" b="0" i="0" u="none" strike="noStrike" cap="none">
-              <a:solidFill>
-                <a:srgbClr val="000000"/>
-              </a:solidFill>
+            <a:endParaRPr lang="en-US">
               <a:latin typeface="Lato" panose="020F0502020204030203"/>
               <a:ea typeface="Lato" panose="020F0502020204030203"/>
               <a:cs typeface="Lato" panose="020F0502020204030203"/>
@@ -35548,7 +35512,7 @@
             </a:endParaRPr>
           </a:p>
           <a:p>
-            <a:pPr marL="285750" marR="0" lvl="0" indent="-285750" algn="l" rtl="0">
+            <a:pPr marL="342900" marR="0" lvl="0" indent="-342900" algn="l" rtl="0">
               <a:lnSpc>
                 <a:spcPct val="100000"/>
               </a:lnSpc>
@@ -35562,25 +35526,19 @@
                 <a:srgbClr val="000000"/>
               </a:buClr>
               <a:buSzPts val="1400"/>
-              <a:buFont typeface="Arial" panose="020B0604020202020204" pitchFamily="34" charset="0"/>
-              <a:buChar char="•"/>
+              <a:buFont typeface="Arial" panose="020B0604020202020204"/>
+              <a:buAutoNum type="arabicPeriod"/>
             </a:pPr>
             <a:r>
-              <a:rPr lang="en-US" sz="1400" b="0" i="0" u="none" strike="noStrike" cap="none">
-                <a:solidFill>
-                  <a:srgbClr val="000000"/>
-                </a:solidFill>
+              <a:rPr lang="en-US">
                 <a:latin typeface="Lato" panose="020F0502020204030203"/>
                 <a:ea typeface="Lato" panose="020F0502020204030203"/>
                 <a:cs typeface="Lato" panose="020F0502020204030203"/>
                 <a:sym typeface="Lato" panose="020F0502020204030203"/>
               </a:rPr>
-              <a:t>Detecting potential fraud sooner.</a:t>
+              <a:t>Requires a high human capital deployment and longer processing time. </a:t>
             </a:r>
-            <a:endParaRPr lang="en-US" sz="1400" b="0" i="0" u="none" strike="noStrike" cap="none">
-              <a:solidFill>
-                <a:srgbClr val="000000"/>
-              </a:solidFill>
+            <a:endParaRPr lang="en-US">
               <a:latin typeface="Lato" panose="020F0502020204030203"/>
               <a:ea typeface="Lato" panose="020F0502020204030203"/>
               <a:cs typeface="Lato" panose="020F0502020204030203"/>
@@ -35588,7 +35546,7 @@
             </a:endParaRPr>
           </a:p>
           <a:p>
-            <a:pPr marL="285750" marR="0" lvl="0" indent="-285750" algn="l" rtl="0">
+            <a:pPr marL="342900" marR="0" lvl="0" indent="-342900" algn="l" rtl="0">
               <a:lnSpc>
                 <a:spcPct val="100000"/>
               </a:lnSpc>
@@ -35603,12 +35561,43 @@
               </a:buClr>
               <a:buSzPts val="1400"/>
               <a:buFont typeface="Arial" panose="020B0604020202020204"/>
-              <a:buNone/>
+              <a:buAutoNum type="arabicPeriod"/>
             </a:pPr>
-            <a:endParaRPr lang="en-US" sz="1400" b="0" i="0" u="none" strike="noStrike" cap="none">
-              <a:solidFill>
+            <a:r>
+              <a:rPr lang="en-US">
+                <a:latin typeface="Lato" panose="020F0502020204030203"/>
+                <a:ea typeface="Lato" panose="020F0502020204030203"/>
+                <a:cs typeface="Lato" panose="020F0502020204030203"/>
+                <a:sym typeface="Lato" panose="020F0502020204030203"/>
+              </a:rPr>
+              <a:t>Cheques from consumer are mostly handwritten and in multilingual and of corporates are mostly printed, This makes more complication since most of OCR can recongize only English.</a:t>
+            </a:r>
+            <a:endParaRPr lang="en-US">
+              <a:latin typeface="Lato" panose="020F0502020204030203"/>
+              <a:ea typeface="Lato" panose="020F0502020204030203"/>
+              <a:cs typeface="Lato" panose="020F0502020204030203"/>
+              <a:sym typeface="Lato" panose="020F0502020204030203"/>
+            </a:endParaRPr>
+          </a:p>
+          <a:p>
+            <a:pPr marL="342900" marR="0" lvl="0" indent="-342900" algn="l" rtl="0">
+              <a:lnSpc>
+                <a:spcPct val="100000"/>
+              </a:lnSpc>
+              <a:spcBef>
+                <a:spcPts val="0"/>
+              </a:spcBef>
+              <a:spcAft>
+                <a:spcPts val="0"/>
+              </a:spcAft>
+              <a:buClr>
                 <a:srgbClr val="000000"/>
-              </a:solidFill>
+              </a:buClr>
+              <a:buSzPts val="1400"/>
+              <a:buFont typeface="Arial" panose="020B0604020202020204"/>
+              <a:buNone/>
+            </a:pPr>
+            <a:endParaRPr lang="en-US">
               <a:latin typeface="Lato" panose="020F0502020204030203"/>
               <a:ea typeface="Lato" panose="020F0502020204030203"/>
               <a:cs typeface="Lato" panose="020F0502020204030203"/>
@@ -35633,18 +35622,115 @@
               <a:buFont typeface="Arial" panose="020B0604020202020204"/>
               <a:buNone/>
             </a:pPr>
+            <a:endParaRPr lang="en-US">
+              <a:latin typeface="Lato" panose="020F0502020204030203"/>
+              <a:ea typeface="Lato" panose="020F0502020204030203"/>
+              <a:cs typeface="Lato" panose="020F0502020204030203"/>
+              <a:sym typeface="Lato" panose="020F0502020204030203"/>
+            </a:endParaRPr>
+          </a:p>
+          <a:p>
+            <a:pPr marL="0" marR="0" lvl="0" indent="0" algn="l" rtl="0">
+              <a:lnSpc>
+                <a:spcPct val="100000"/>
+              </a:lnSpc>
+              <a:spcBef>
+                <a:spcPts val="0"/>
+              </a:spcBef>
+              <a:spcAft>
+                <a:spcPts val="0"/>
+              </a:spcAft>
+              <a:buClr>
+                <a:srgbClr val="000000"/>
+              </a:buClr>
+              <a:buSzPts val="1400"/>
+              <a:buFont typeface="Arial" panose="020B0604020202020204"/>
+              <a:buNone/>
+            </a:pPr>
+            <a:endParaRPr lang="en-US">
+              <a:latin typeface="Lato" panose="020F0502020204030203"/>
+              <a:ea typeface="Lato" panose="020F0502020204030203"/>
+              <a:cs typeface="Lato" panose="020F0502020204030203"/>
+              <a:sym typeface="Lato" panose="020F0502020204030203"/>
+            </a:endParaRPr>
+          </a:p>
+          <a:p>
+            <a:pPr marL="0" marR="0" lvl="0" indent="0" algn="l" rtl="0">
+              <a:lnSpc>
+                <a:spcPct val="100000"/>
+              </a:lnSpc>
+              <a:spcBef>
+                <a:spcPts val="0"/>
+              </a:spcBef>
+              <a:spcAft>
+                <a:spcPts val="0"/>
+              </a:spcAft>
+              <a:buClr>
+                <a:srgbClr val="000000"/>
+              </a:buClr>
+              <a:buSzPts val="1400"/>
+              <a:buFont typeface="Arial" panose="020B0604020202020204"/>
+              <a:buNone/>
+            </a:pPr>
             <a:r>
-              <a:rPr lang="en-US" sz="1400" b="0" i="0" u="none" strike="noStrike" cap="none">
-                <a:solidFill>
-                  <a:srgbClr val="000000"/>
-                </a:solidFill>
+              <a:rPr lang="en-US">
                 <a:latin typeface="Lato" panose="020F0502020204030203"/>
                 <a:ea typeface="Lato" panose="020F0502020204030203"/>
                 <a:cs typeface="Lato" panose="020F0502020204030203"/>
                 <a:sym typeface="Lato" panose="020F0502020204030203"/>
               </a:rPr>
-              <a:t>With the availability of cloud based Azure technology , AI, improved OCR processing we can leverage computer vision API and extend the same for extracting data of hand filled application form with Azure Form Recognizer. This helps to provide technical solution for banking business problem. As technology enthuisaist, we three joined together to participate in this challenge to give technical working POC.</a:t>
+              <a:t> </a:t>
             </a:r>
+            <a:endParaRPr lang="en-US">
+              <a:latin typeface="Lato" panose="020F0502020204030203"/>
+              <a:ea typeface="Lato" panose="020F0502020204030203"/>
+              <a:cs typeface="Lato" panose="020F0502020204030203"/>
+              <a:sym typeface="Lato" panose="020F0502020204030203"/>
+            </a:endParaRPr>
+          </a:p>
+          <a:p>
+            <a:pPr marL="0" marR="0" lvl="0" indent="0" algn="l" rtl="0">
+              <a:lnSpc>
+                <a:spcPct val="100000"/>
+              </a:lnSpc>
+              <a:spcBef>
+                <a:spcPts val="0"/>
+              </a:spcBef>
+              <a:spcAft>
+                <a:spcPts val="0"/>
+              </a:spcAft>
+              <a:buClr>
+                <a:srgbClr val="000000"/>
+              </a:buClr>
+              <a:buSzPts val="1400"/>
+              <a:buFont typeface="Arial" panose="020B0604020202020204"/>
+              <a:buNone/>
+            </a:pPr>
+            <a:endParaRPr lang="en-US">
+              <a:latin typeface="Lato" panose="020F0502020204030203"/>
+              <a:ea typeface="Lato" panose="020F0502020204030203"/>
+              <a:cs typeface="Lato" panose="020F0502020204030203"/>
+              <a:sym typeface="Lato" panose="020F0502020204030203"/>
+            </a:endParaRPr>
+          </a:p>
+          <a:p>
+            <a:pPr marL="0" marR="0" lvl="0" indent="0" algn="l" rtl="0">
+              <a:lnSpc>
+                <a:spcPct val="100000"/>
+              </a:lnSpc>
+              <a:spcBef>
+                <a:spcPts val="0"/>
+              </a:spcBef>
+              <a:spcAft>
+                <a:spcPts val="0"/>
+              </a:spcAft>
+              <a:buClr>
+                <a:srgbClr val="000000"/>
+              </a:buClr>
+              <a:buSzPts val="1400"/>
+              <a:buFont typeface="Arial" panose="020B0604020202020204"/>
+              <a:buNone/>
+            </a:pPr>
             <a:endParaRPr lang="en-US" sz="1400" b="0" i="0" u="none" strike="noStrike" cap="none">
               <a:solidFill>
                 <a:srgbClr val="000000"/>
@@ -36471,7 +36557,7 @@
                 <a:ea typeface="Lato" panose="020F0502020204030203"/>
                 <a:cs typeface="Lato" panose="020F0502020204030203"/>
                 <a:sym typeface="Lato" panose="020F0502020204030203"/>
-                <a:hlinkClick r:id="rId1" tooltip="" action="ppaction://hlinkfile"/>
+                <a:hlinkClick r:id="rId1" action="ppaction://hlinkfile"/>
               </a:rPr>
               <a:t>Chequereader </a:t>
             </a:r>
@@ -36486,7 +36572,7 @@
               <a:ea typeface="Lato" panose="020F0502020204030203"/>
               <a:cs typeface="Lato" panose="020F0502020204030203"/>
               <a:sym typeface="Lato" panose="020F0502020204030203"/>
-              <a:hlinkClick r:id="rId1" tooltip="" action="ppaction://hlinkfile"/>
+              <a:hlinkClick r:id="rId1" action="ppaction://hlinkfile"/>
             </a:endParaRPr>
           </a:p>
           <a:p>
@@ -36809,7 +36895,7 @@
               <a:ea typeface="Lato" panose="020F0502020204030203"/>
               <a:cs typeface="Lato" panose="020F0502020204030203"/>
               <a:sym typeface="Lato" panose="020F0502020204030203"/>
-              <a:hlinkClick r:id="rId1" tooltip="" action="ppaction://hlinkfile"/>
+              <a:hlinkClick r:id="rId1" action="ppaction://hlinkfile"/>
             </a:endParaRPr>
           </a:p>
           <a:p>
@@ -36936,7 +37022,7 @@
       </p:sp>
       <p:sp>
         <p:nvSpPr>
-          <p:cNvPr id="1" name="Google Shape;359;p4"/>
+          <p:cNvPr id="2" name="Google Shape;359;p4"/>
           <p:cNvSpPr txBox="1"/>
           <p:nvPr/>
         </p:nvSpPr>
@@ -36987,7 +37073,7 @@
                 <a:ea typeface="Lato" panose="020F0502020204030203"/>
                 <a:cs typeface="Lato" panose="020F0502020204030203"/>
                 <a:sym typeface="Lato" panose="020F0502020204030203"/>
-                <a:hlinkClick r:id="rId2" tooltip="" action="ppaction://hlinkfile"/>
+                <a:hlinkClick r:id="rId2" action="ppaction://hlinkfile"/>
               </a:rPr>
               <a:t>Fraudone</a:t>
             </a:r>
@@ -38308,10 +38394,7 @@
               <a:buNone/>
             </a:pPr>
             <a:r>
-              <a:rPr lang="en-GB" sz="1400" b="0" i="0" u="none" strike="noStrike" cap="none">
-                <a:solidFill>
-                  <a:srgbClr val="222222"/>
-                </a:solidFill>
+              <a:rPr lang="en-US">
                 <a:highlight>
                   <a:srgbClr val="FFFFFF"/>
                 </a:highlight>
@@ -38320,8 +38403,316 @@
                 <a:cs typeface="Lato" panose="020F0502020204030203"/>
                 <a:sym typeface="Lato" panose="020F0502020204030203"/>
               </a:rPr>
-              <a:t>How is your solution better than alternatives and how do you plan to build adoption?</a:t>
+              <a:t>Automated Cheque Processing (ACP) allows for faster cheque clearing. With ACP, deposited cheques are cleared in hours</a:t>
             </a:r>
+            <a:endParaRPr lang="en-US" b="0" i="0" u="none" strike="noStrike" cap="none">
+              <a:solidFill>
+                <a:srgbClr val="000000"/>
+              </a:solidFill>
+              <a:highlight>
+                <a:srgbClr val="FFFFFF"/>
+              </a:highlight>
+              <a:latin typeface="Lato" panose="020F0502020204030203"/>
+              <a:ea typeface="Lato" panose="020F0502020204030203"/>
+              <a:cs typeface="Lato" panose="020F0502020204030203"/>
+              <a:sym typeface="Lato" panose="020F0502020204030203"/>
+            </a:endParaRPr>
+          </a:p>
+          <a:p>
+            <a:pPr marL="0" marR="0" lvl="0" indent="0" algn="l" rtl="0">
+              <a:lnSpc>
+                <a:spcPct val="100000"/>
+              </a:lnSpc>
+              <a:spcBef>
+                <a:spcPts val="0"/>
+              </a:spcBef>
+              <a:spcAft>
+                <a:spcPts val="0"/>
+              </a:spcAft>
+              <a:buClr>
+                <a:srgbClr val="000000"/>
+              </a:buClr>
+              <a:buSzPts val="1400"/>
+              <a:buFont typeface="Arial" panose="020B0604020202020204"/>
+              <a:buNone/>
+            </a:pPr>
+            <a:endParaRPr lang="en-US" b="0" i="0" u="none" strike="noStrike" cap="none">
+              <a:solidFill>
+                <a:srgbClr val="000000"/>
+              </a:solidFill>
+              <a:highlight>
+                <a:srgbClr val="FFFFFF"/>
+              </a:highlight>
+              <a:latin typeface="Lato" panose="020F0502020204030203"/>
+              <a:ea typeface="Lato" panose="020F0502020204030203"/>
+              <a:cs typeface="Lato" panose="020F0502020204030203"/>
+              <a:sym typeface="Lato" panose="020F0502020204030203"/>
+            </a:endParaRPr>
+          </a:p>
+          <a:p>
+            <a:pPr marL="0" marR="0" lvl="0" indent="0" algn="l" rtl="0">
+              <a:lnSpc>
+                <a:spcPct val="100000"/>
+              </a:lnSpc>
+              <a:spcBef>
+                <a:spcPts val="0"/>
+              </a:spcBef>
+              <a:spcAft>
+                <a:spcPts val="0"/>
+              </a:spcAft>
+              <a:buClr>
+                <a:srgbClr val="000000"/>
+              </a:buClr>
+              <a:buSzPts val="1400"/>
+              <a:buFont typeface="Arial" panose="020B0604020202020204"/>
+              <a:buNone/>
+            </a:pPr>
+            <a:r>
+              <a:rPr lang="en-US">
+                <a:highlight>
+                  <a:srgbClr val="FFFFFF"/>
+                </a:highlight>
+                <a:latin typeface="Lato" panose="020F0502020204030203"/>
+                <a:ea typeface="Lato" panose="020F0502020204030203"/>
+                <a:cs typeface="Lato" panose="020F0502020204030203"/>
+                <a:sym typeface="Lato" panose="020F0502020204030203"/>
+              </a:rPr>
+              <a:t>ACP benefits consumers by:</a:t>
+            </a:r>
+            <a:endParaRPr lang="en-US" b="0" i="0" u="none" strike="noStrike" cap="none">
+              <a:solidFill>
+                <a:srgbClr val="000000"/>
+              </a:solidFill>
+              <a:highlight>
+                <a:srgbClr val="FFFFFF"/>
+              </a:highlight>
+              <a:latin typeface="Lato" panose="020F0502020204030203"/>
+              <a:ea typeface="Lato" panose="020F0502020204030203"/>
+              <a:cs typeface="Lato" panose="020F0502020204030203"/>
+              <a:sym typeface="Lato" panose="020F0502020204030203"/>
+            </a:endParaRPr>
+          </a:p>
+          <a:p>
+            <a:pPr marL="285750" marR="0" lvl="0" indent="-285750" algn="l" rtl="0">
+              <a:lnSpc>
+                <a:spcPct val="100000"/>
+              </a:lnSpc>
+              <a:spcBef>
+                <a:spcPts val="0"/>
+              </a:spcBef>
+              <a:spcAft>
+                <a:spcPts val="0"/>
+              </a:spcAft>
+              <a:buClr>
+                <a:srgbClr val="000000"/>
+              </a:buClr>
+              <a:buSzPts val="1400"/>
+              <a:buFont typeface="Arial" panose="020B0604020202020204" pitchFamily="34" charset="0"/>
+              <a:buChar char="•"/>
+            </a:pPr>
+            <a:r>
+              <a:rPr lang="en-US">
+                <a:highlight>
+                  <a:srgbClr val="FFFFFF"/>
+                </a:highlight>
+                <a:latin typeface="Lato" panose="020F0502020204030203"/>
+                <a:ea typeface="Lato" panose="020F0502020204030203"/>
+                <a:cs typeface="Lato" panose="020F0502020204030203"/>
+                <a:sym typeface="Lato" panose="020F0502020204030203"/>
+              </a:rPr>
+              <a:t>Making funds available faster</a:t>
+            </a:r>
+            <a:endParaRPr lang="en-US" b="0" i="0" u="none" strike="noStrike" cap="none">
+              <a:solidFill>
+                <a:srgbClr val="000000"/>
+              </a:solidFill>
+              <a:highlight>
+                <a:srgbClr val="FFFFFF"/>
+              </a:highlight>
+              <a:latin typeface="Lato" panose="020F0502020204030203"/>
+              <a:ea typeface="Lato" panose="020F0502020204030203"/>
+              <a:cs typeface="Lato" panose="020F0502020204030203"/>
+              <a:sym typeface="Lato" panose="020F0502020204030203"/>
+            </a:endParaRPr>
+          </a:p>
+          <a:p>
+            <a:pPr marL="285750" marR="0" lvl="0" indent="-285750" algn="l" rtl="0">
+              <a:lnSpc>
+                <a:spcPct val="100000"/>
+              </a:lnSpc>
+              <a:spcBef>
+                <a:spcPts val="0"/>
+              </a:spcBef>
+              <a:spcAft>
+                <a:spcPts val="0"/>
+              </a:spcAft>
+              <a:buClr>
+                <a:srgbClr val="000000"/>
+              </a:buClr>
+              <a:buSzPts val="1400"/>
+              <a:buFont typeface="Arial" panose="020B0604020202020204" pitchFamily="34" charset="0"/>
+              <a:buChar char="•"/>
+            </a:pPr>
+            <a:r>
+              <a:rPr lang="en-US">
+                <a:highlight>
+                  <a:srgbClr val="FFFFFF"/>
+                </a:highlight>
+                <a:latin typeface="Lato" panose="020F0502020204030203"/>
+                <a:ea typeface="Lato" panose="020F0502020204030203"/>
+                <a:cs typeface="Lato" panose="020F0502020204030203"/>
+                <a:sym typeface="Lato" panose="020F0502020204030203"/>
+              </a:rPr>
+              <a:t>Allowing quicker access to the digital image of their processed cheques</a:t>
+            </a:r>
+            <a:endParaRPr lang="en-US" b="0" i="0" u="none" strike="noStrike" cap="none">
+              <a:solidFill>
+                <a:srgbClr val="000000"/>
+              </a:solidFill>
+              <a:highlight>
+                <a:srgbClr val="FFFFFF"/>
+              </a:highlight>
+              <a:latin typeface="Lato" panose="020F0502020204030203"/>
+              <a:ea typeface="Lato" panose="020F0502020204030203"/>
+              <a:cs typeface="Lato" panose="020F0502020204030203"/>
+              <a:sym typeface="Lato" panose="020F0502020204030203"/>
+            </a:endParaRPr>
+          </a:p>
+          <a:p>
+            <a:pPr marL="285750" marR="0" lvl="0" indent="-285750" algn="l" rtl="0">
+              <a:lnSpc>
+                <a:spcPct val="100000"/>
+              </a:lnSpc>
+              <a:spcBef>
+                <a:spcPts val="0"/>
+              </a:spcBef>
+              <a:spcAft>
+                <a:spcPts val="0"/>
+              </a:spcAft>
+              <a:buClr>
+                <a:srgbClr val="000000"/>
+              </a:buClr>
+              <a:buSzPts val="1400"/>
+              <a:buFont typeface="Arial" panose="020B0604020202020204" pitchFamily="34" charset="0"/>
+              <a:buChar char="•"/>
+            </a:pPr>
+            <a:r>
+              <a:rPr lang="en-US">
+                <a:highlight>
+                  <a:srgbClr val="FFFFFF"/>
+                </a:highlight>
+                <a:latin typeface="Lato" panose="020F0502020204030203"/>
+                <a:ea typeface="Lato" panose="020F0502020204030203"/>
+                <a:cs typeface="Lato" panose="020F0502020204030203"/>
+                <a:sym typeface="Lato" panose="020F0502020204030203"/>
+              </a:rPr>
+              <a:t>Detecting potential fraud sooner.</a:t>
+            </a:r>
+            <a:endParaRPr lang="en-US" b="0" i="0" u="none" strike="noStrike" cap="none">
+              <a:solidFill>
+                <a:srgbClr val="000000"/>
+              </a:solidFill>
+              <a:highlight>
+                <a:srgbClr val="FFFFFF"/>
+              </a:highlight>
+              <a:latin typeface="Lato" panose="020F0502020204030203"/>
+              <a:ea typeface="Lato" panose="020F0502020204030203"/>
+              <a:cs typeface="Lato" panose="020F0502020204030203"/>
+              <a:sym typeface="Lato" panose="020F0502020204030203"/>
+            </a:endParaRPr>
+          </a:p>
+          <a:p>
+            <a:pPr marL="285750" marR="0" lvl="0" indent="-285750" algn="l" rtl="0">
+              <a:lnSpc>
+                <a:spcPct val="100000"/>
+              </a:lnSpc>
+              <a:spcBef>
+                <a:spcPts val="0"/>
+              </a:spcBef>
+              <a:spcAft>
+                <a:spcPts val="0"/>
+              </a:spcAft>
+              <a:buClr>
+                <a:srgbClr val="000000"/>
+              </a:buClr>
+              <a:buSzPts val="1400"/>
+              <a:buFont typeface="Arial" panose="020B0604020202020204"/>
+              <a:buNone/>
+            </a:pPr>
+            <a:endParaRPr lang="en-US" b="0" i="0" u="none" strike="noStrike" cap="none">
+              <a:solidFill>
+                <a:srgbClr val="000000"/>
+              </a:solidFill>
+              <a:highlight>
+                <a:srgbClr val="FFFFFF"/>
+              </a:highlight>
+              <a:latin typeface="Lato" panose="020F0502020204030203"/>
+              <a:ea typeface="Lato" panose="020F0502020204030203"/>
+              <a:cs typeface="Lato" panose="020F0502020204030203"/>
+              <a:sym typeface="Lato" panose="020F0502020204030203"/>
+            </a:endParaRPr>
+          </a:p>
+          <a:p>
+            <a:pPr marL="0" marR="0" lvl="0" indent="0" algn="l" rtl="0">
+              <a:lnSpc>
+                <a:spcPct val="100000"/>
+              </a:lnSpc>
+              <a:spcBef>
+                <a:spcPts val="0"/>
+              </a:spcBef>
+              <a:spcAft>
+                <a:spcPts val="0"/>
+              </a:spcAft>
+              <a:buClr>
+                <a:srgbClr val="000000"/>
+              </a:buClr>
+              <a:buSzPts val="1400"/>
+              <a:buFont typeface="Arial" panose="020B0604020202020204"/>
+              <a:buNone/>
+            </a:pPr>
+            <a:r>
+              <a:rPr lang="en-US">
+                <a:highlight>
+                  <a:srgbClr val="FFFFFF"/>
+                </a:highlight>
+                <a:latin typeface="Lato" panose="020F0502020204030203"/>
+                <a:ea typeface="Lato" panose="020F0502020204030203"/>
+                <a:cs typeface="Lato" panose="020F0502020204030203"/>
+                <a:sym typeface="Lato" panose="020F0502020204030203"/>
+              </a:rPr>
+              <a:t>With the availability of cloud based Azure technology , AI, improved OCR processing we can leverage computer vision API and extend the same for extracting data of hand filled application form with Azure Form Recognizer. This helps to provide technical solution for banking business problem. As technology enthuisaist, we three joined together to participate in this challenge to give technical working POC.</a:t>
+            </a:r>
+            <a:endParaRPr lang="en-US" b="0" i="0" u="none" strike="noStrike" cap="none">
+              <a:solidFill>
+                <a:srgbClr val="000000"/>
+              </a:solidFill>
+              <a:highlight>
+                <a:srgbClr val="FFFFFF"/>
+              </a:highlight>
+              <a:latin typeface="Lato" panose="020F0502020204030203"/>
+              <a:ea typeface="Lato" panose="020F0502020204030203"/>
+              <a:cs typeface="Lato" panose="020F0502020204030203"/>
+              <a:sym typeface="Lato" panose="020F0502020204030203"/>
+            </a:endParaRPr>
+          </a:p>
+          <a:p>
+            <a:pPr marL="0" marR="0" lvl="0" indent="0" algn="l" rtl="0">
+              <a:lnSpc>
+                <a:spcPct val="100000"/>
+              </a:lnSpc>
+              <a:spcBef>
+                <a:spcPts val="0"/>
+              </a:spcBef>
+              <a:spcAft>
+                <a:spcPts val="0"/>
+              </a:spcAft>
+              <a:buClr>
+                <a:srgbClr val="000000"/>
+              </a:buClr>
+              <a:buSzPts val="1400"/>
+              <a:buFont typeface="Arial" panose="020B0604020202020204"/>
+              <a:buNone/>
+            </a:pPr>
             <a:endParaRPr sz="1400" b="0" i="0" u="none" strike="noStrike" cap="none">
               <a:solidFill>
                 <a:srgbClr val="000000"/>

</xml_diff>

<commit_message>
updated with competetor product, problem statement and key differentor
</commit_message>
<xml_diff>
--- a/bob_automatedcheck_3GuysFromEdinburgh.pptx
+++ b/bob_automatedcheck_3GuysFromEdinburgh.pptx
@@ -34775,7 +34775,7 @@
                 <a:ea typeface="Trebuchet MS" panose="020B0603020202020204"/>
                 <a:cs typeface="Trebuchet MS" panose="020B0603020202020204"/>
                 <a:sym typeface="Trebuchet MS" panose="020B0603020202020204"/>
-                <a:hlinkClick r:id="rId2" tooltip="" action="ppaction://hlinkfile"/>
+                <a:hlinkClick r:id="rId2" action="ppaction://hlinkfile"/>
               </a:rPr>
               <a:t>Sivakumar Sankararaman</a:t>
             </a:r>
@@ -36903,53 +36903,6 @@
               <a:ea typeface="Lato" panose="020F0502020204030203"/>
               <a:cs typeface="Lato" panose="020F0502020204030203"/>
               <a:sym typeface="Lato" panose="020F0502020204030203"/>
-            </a:endParaRPr>
-          </a:p>
-          <a:p>
-            <a:pPr marL="285750" marR="0" lvl="0" indent="-285750" algn="l" rtl="0">
-              <a:lnSpc>
-                <a:spcPct val="115000"/>
-              </a:lnSpc>
-              <a:spcBef>
-                <a:spcPts val="1000"/>
-              </a:spcBef>
-              <a:spcAft>
-                <a:spcPts val="1000"/>
-              </a:spcAft>
-              <a:buClr>
-                <a:srgbClr val="000000"/>
-              </a:buClr>
-              <a:buSzPts val="1400"/>
-              <a:buFont typeface="Arial" panose="020B0604020202020204" pitchFamily="34" charset="0"/>
-              <a:buChar char="•"/>
-            </a:pPr>
-            <a:r>
-              <a:rPr lang="en-US" altLang="en-GB" sz="1000" b="0" i="0" u="none" strike="noStrike" cap="none">
-                <a:solidFill>
-                  <a:srgbClr val="222222"/>
-                </a:solidFill>
-                <a:highlight>
-                  <a:srgbClr val="FFFFFF"/>
-                </a:highlight>
-                <a:latin typeface="Lato" panose="020F0502020204030203"/>
-                <a:ea typeface="Lato" panose="020F0502020204030203"/>
-                <a:cs typeface="Lato" panose="020F0502020204030203"/>
-                <a:sym typeface="Lato" panose="020F0502020204030203"/>
-              </a:rPr>
-              <a:t>Automatic UV Logo Verification (To Prevent Fraud)</a:t>
-            </a:r>
-            <a:endParaRPr lang="en-US" altLang="en-GB" sz="1400" b="0" i="0" u="none" strike="noStrike" cap="none">
-              <a:solidFill>
-                <a:srgbClr val="222222"/>
-              </a:solidFill>
-              <a:highlight>
-                <a:srgbClr val="FFFFFF"/>
-              </a:highlight>
-              <a:latin typeface="Lato" panose="020F0502020204030203"/>
-              <a:ea typeface="Lato" panose="020F0502020204030203"/>
-              <a:cs typeface="Lato" panose="020F0502020204030203"/>
-              <a:sym typeface="Lato" panose="020F0502020204030203"/>
-              <a:hlinkClick r:id="rId1" action="ppaction://hlinkfile"/>
             </a:endParaRPr>
           </a:p>
           <a:p>

</xml_diff>